<commit_message>
small correction on powerpoint
</commit_message>
<xml_diff>
--- a/mmcvrp/VrpSets/MM-CVRP-v2.pptx
+++ b/mmcvrp/VrpSets/MM-CVRP-v2.pptx
@@ -298,7 +298,7 @@
           <a:p>
             <a:fld id="{3CAE62F0-6781-425F-9EFC-2BBEB9710DA5}" type="datetimeFigureOut">
               <a:rPr lang="it-IT" smtClean="0"/>
-              <a:t>22/07/2025</a:t>
+              <a:t>23/07/2025</a:t>
             </a:fld>
             <a:endParaRPr lang="it-IT"/>
           </a:p>
@@ -496,7 +496,7 @@
           <a:p>
             <a:fld id="{3CAE62F0-6781-425F-9EFC-2BBEB9710DA5}" type="datetimeFigureOut">
               <a:rPr lang="it-IT" smtClean="0"/>
-              <a:t>22/07/2025</a:t>
+              <a:t>23/07/2025</a:t>
             </a:fld>
             <a:endParaRPr lang="it-IT"/>
           </a:p>
@@ -704,7 +704,7 @@
           <a:p>
             <a:fld id="{3CAE62F0-6781-425F-9EFC-2BBEB9710DA5}" type="datetimeFigureOut">
               <a:rPr lang="it-IT" smtClean="0"/>
-              <a:t>22/07/2025</a:t>
+              <a:t>23/07/2025</a:t>
             </a:fld>
             <a:endParaRPr lang="it-IT"/>
           </a:p>
@@ -902,7 +902,7 @@
           <a:p>
             <a:fld id="{3CAE62F0-6781-425F-9EFC-2BBEB9710DA5}" type="datetimeFigureOut">
               <a:rPr lang="it-IT" smtClean="0"/>
-              <a:t>22/07/2025</a:t>
+              <a:t>23/07/2025</a:t>
             </a:fld>
             <a:endParaRPr lang="it-IT"/>
           </a:p>
@@ -1177,7 +1177,7 @@
           <a:p>
             <a:fld id="{3CAE62F0-6781-425F-9EFC-2BBEB9710DA5}" type="datetimeFigureOut">
               <a:rPr lang="it-IT" smtClean="0"/>
-              <a:t>22/07/2025</a:t>
+              <a:t>23/07/2025</a:t>
             </a:fld>
             <a:endParaRPr lang="it-IT"/>
           </a:p>
@@ -1442,7 +1442,7 @@
           <a:p>
             <a:fld id="{3CAE62F0-6781-425F-9EFC-2BBEB9710DA5}" type="datetimeFigureOut">
               <a:rPr lang="it-IT" smtClean="0"/>
-              <a:t>22/07/2025</a:t>
+              <a:t>23/07/2025</a:t>
             </a:fld>
             <a:endParaRPr lang="it-IT"/>
           </a:p>
@@ -1854,7 +1854,7 @@
           <a:p>
             <a:fld id="{3CAE62F0-6781-425F-9EFC-2BBEB9710DA5}" type="datetimeFigureOut">
               <a:rPr lang="it-IT" smtClean="0"/>
-              <a:t>22/07/2025</a:t>
+              <a:t>23/07/2025</a:t>
             </a:fld>
             <a:endParaRPr lang="it-IT"/>
           </a:p>
@@ -1995,7 +1995,7 @@
           <a:p>
             <a:fld id="{3CAE62F0-6781-425F-9EFC-2BBEB9710DA5}" type="datetimeFigureOut">
               <a:rPr lang="it-IT" smtClean="0"/>
-              <a:t>22/07/2025</a:t>
+              <a:t>23/07/2025</a:t>
             </a:fld>
             <a:endParaRPr lang="it-IT"/>
           </a:p>
@@ -2108,7 +2108,7 @@
           <a:p>
             <a:fld id="{3CAE62F0-6781-425F-9EFC-2BBEB9710DA5}" type="datetimeFigureOut">
               <a:rPr lang="it-IT" smtClean="0"/>
-              <a:t>22/07/2025</a:t>
+              <a:t>23/07/2025</a:t>
             </a:fld>
             <a:endParaRPr lang="it-IT"/>
           </a:p>
@@ -2419,7 +2419,7 @@
           <a:p>
             <a:fld id="{3CAE62F0-6781-425F-9EFC-2BBEB9710DA5}" type="datetimeFigureOut">
               <a:rPr lang="it-IT" smtClean="0"/>
-              <a:t>22/07/2025</a:t>
+              <a:t>23/07/2025</a:t>
             </a:fld>
             <a:endParaRPr lang="it-IT"/>
           </a:p>
@@ -2707,7 +2707,7 @@
           <a:p>
             <a:fld id="{3CAE62F0-6781-425F-9EFC-2BBEB9710DA5}" type="datetimeFigureOut">
               <a:rPr lang="it-IT" smtClean="0"/>
-              <a:t>22/07/2025</a:t>
+              <a:t>23/07/2025</a:t>
             </a:fld>
             <a:endParaRPr lang="it-IT"/>
           </a:p>
@@ -2948,7 +2948,7 @@
           <a:p>
             <a:fld id="{3CAE62F0-6781-425F-9EFC-2BBEB9710DA5}" type="datetimeFigureOut">
               <a:rPr lang="it-IT" smtClean="0"/>
-              <a:t>22/07/2025</a:t>
+              <a:t>23/07/2025</a:t>
             </a:fld>
             <a:endParaRPr lang="it-IT"/>
           </a:p>
@@ -11377,15 +11377,19 @@
           <a:p>
             <a:r>
               <a:rPr lang="en-US" noProof="0" dirty="0"/>
-              <a:t>For the models without the implied constraint,  it is possible to define just one type of transition from the current location from a location different from the depot, reducing </a:t>
-            </a:r>
-            <a:r>
-              <a:rPr lang="en-US" noProof="0" dirty="0" err="1"/>
-              <a:t>th</a:t>
+              <a:t>For the models without the implied constraint,  it is possible to define just one type of transition from the current location </a:t>
             </a:r>
             <a:r>
               <a:rPr lang="en-US" dirty="0"/>
-              <a:t>e complexity of the model.</a:t>
+              <a:t>to</a:t>
+            </a:r>
+            <a:r>
+              <a:rPr lang="en-US" noProof="0" dirty="0"/>
+              <a:t> a location different from the depot, reducing the</a:t>
+            </a:r>
+            <a:r>
+              <a:rPr lang="en-US" dirty="0"/>
+              <a:t> complexity of the model.</a:t>
             </a:r>
             <a:endParaRPr lang="en-US" noProof="0" dirty="0"/>
           </a:p>
@@ -11562,8 +11566,13 @@
                 </a14:m>
                 <a:r>
                   <a:rPr lang="en-US" noProof="0" dirty="0"/>
-                  <a:t>: partial cost</a:t>
+                  <a:t>: partial </a:t>
                 </a:r>
+                <a:r>
+                  <a:rPr lang="en-US" dirty="0"/>
+                  <a:t>distance</a:t>
+                </a:r>
+                <a:endParaRPr lang="en-US" noProof="0" dirty="0"/>
               </a:p>
               <a:p>
                 <a:endParaRPr lang="en-US" noProof="0" dirty="0"/>
@@ -13894,20 +13903,55 @@
                                                 </a:rPr>
                                                 <m:t>,</m:t>
                                               </m:r>
-                                              <m:r>
-                                                <a:rPr lang="en-US" sz="1875" b="0" i="1" noProof="0" smtClean="0">
-                                                  <a:latin typeface="Cambria Math" panose="02040503050406030204" pitchFamily="18" charset="0"/>
-                                                  <a:ea typeface="Cambria Math" panose="02040503050406030204" pitchFamily="18" charset="0"/>
-                                                </a:rPr>
-                                                <m:t>𝑝</m:t>
-                                              </m:r>
-                                              <m:r>
-                                                <a:rPr lang="en-US" sz="1875" b="0" i="1" noProof="0" smtClean="0">
-                                                  <a:latin typeface="Cambria Math" panose="02040503050406030204" pitchFamily="18" charset="0"/>
-                                                  <a:ea typeface="Cambria Math" panose="02040503050406030204" pitchFamily="18" charset="0"/>
-                                                </a:rPr>
-                                                <m:t> </m:t>
-                                              </m:r>
+                                              <m:sSub>
+                                                <m:sSubPr>
+                                                  <m:ctrlPr>
+                                                    <a:rPr lang="en-US" sz="1875" i="1">
+                                                      <a:latin typeface="Cambria Math" panose="02040503050406030204" pitchFamily="18" charset="0"/>
+                                                      <a:ea typeface="Cambria Math" panose="02040503050406030204" pitchFamily="18" charset="0"/>
+                                                    </a:rPr>
+                                                  </m:ctrlPr>
+                                                </m:sSubPr>
+                                                <m:e>
+                                                  <m:r>
+                                                    <a:rPr lang="en-US" sz="1875" i="1">
+                                                      <a:latin typeface="Cambria Math" panose="02040503050406030204" pitchFamily="18" charset="0"/>
+                                                      <a:ea typeface="Cambria Math" panose="02040503050406030204" pitchFamily="18" charset="0"/>
+                                                    </a:rPr>
+                                                    <m:t>𝑝</m:t>
+                                                  </m:r>
+                                                  <m:r>
+                                                    <a:rPr lang="en-US" sz="1875" i="1">
+                                                      <a:latin typeface="Cambria Math" panose="02040503050406030204" pitchFamily="18" charset="0"/>
+                                                      <a:ea typeface="Cambria Math" panose="02040503050406030204" pitchFamily="18" charset="0"/>
+                                                    </a:rPr>
+                                                    <m:t>+ </m:t>
+                                                  </m:r>
+                                                  <m:r>
+                                                    <a:rPr lang="en-US" sz="1875" i="1">
+                                                      <a:latin typeface="Cambria Math" panose="02040503050406030204" pitchFamily="18" charset="0"/>
+                                                      <a:ea typeface="Cambria Math" panose="02040503050406030204" pitchFamily="18" charset="0"/>
+                                                    </a:rPr>
+                                                    <m:t>𝑐</m:t>
+                                                  </m:r>
+                                                </m:e>
+                                                <m:sub>
+                                                  <m:r>
+                                                    <a:rPr lang="en-US" sz="1875" i="1">
+                                                      <a:latin typeface="Cambria Math" panose="02040503050406030204" pitchFamily="18" charset="0"/>
+                                                      <a:ea typeface="Cambria Math" panose="02040503050406030204" pitchFamily="18" charset="0"/>
+                                                    </a:rPr>
+                                                    <m:t>𝑖</m:t>
+                                                  </m:r>
+                                                  <m:r>
+                                                    <a:rPr lang="en-US" sz="1875" i="1">
+                                                      <a:latin typeface="Cambria Math" panose="02040503050406030204" pitchFamily="18" charset="0"/>
+                                                      <a:ea typeface="Cambria Math" panose="02040503050406030204" pitchFamily="18" charset="0"/>
+                                                    </a:rPr>
+                                                    <m:t>0</m:t>
+                                                  </m:r>
+                                                </m:sub>
+                                              </m:sSub>
                                             </m:e>
                                           </m:d>
                                         </m:e>
@@ -13917,7 +13961,7 @@
                                           <a:latin typeface="Cambria Math" panose="02040503050406030204" pitchFamily="18" charset="0"/>
                                           <a:ea typeface="Cambria Math" panose="02040503050406030204" pitchFamily="18" charset="0"/>
                                         </a:rPr>
-                                        <m:t>                                                                                                         </m:t>
+                                        <m:t>                                                                                                </m:t>
                                       </m:r>
                                     </m:e>
                                   </m:func>
@@ -14290,10 +14334,10 @@
                           <m:t>,</m:t>
                         </m:r>
                         <m:r>
-                          <a:rPr lang="en-US" b="0" i="1" noProof="0" smtClean="0">
+                          <a:rPr lang="it-IT" b="0" i="1" noProof="0" smtClean="0">
                             <a:latin typeface="Cambria Math" panose="02040503050406030204" pitchFamily="18" charset="0"/>
                           </a:rPr>
-                          <m:t>𝑡</m:t>
+                          <m:t>𝑝</m:t>
                         </m:r>
                       </m:e>
                     </m:d>
@@ -16823,11 +16867,7 @@
           <a:p>
             <a:r>
               <a:rPr lang="en-US" noProof="0" dirty="0"/>
-              <a:t>The Cp mod</a:t>
-            </a:r>
-            <a:r>
-              <a:rPr lang="en-US" dirty="0" err="1"/>
-              <a:t>el</a:t>
+              <a:t>The CP model</a:t>
             </a:r>
             <a:r>
               <a:rPr lang="en-US" dirty="0"/>
@@ -18125,7 +18165,15 @@
           <a:p>
             <a:r>
               <a:rPr lang="en-US" noProof="0" dirty="0"/>
-              <a:t>The performance’s trends that can be observed are the same of the previous DIDP model:  both the dual bound and the implied constraint make things worse.</a:t>
+              <a:t>The performance’s trends that can be observed are the same of the previous DIDP model:  both the dual bound and the implied constraint make the</a:t>
+            </a:r>
+            <a:r>
+              <a:rPr lang="en-US" dirty="0"/>
+              <a:t> performance</a:t>
+            </a:r>
+            <a:r>
+              <a:rPr lang="en-US" noProof="0" dirty="0"/>
+              <a:t> worse.</a:t>
             </a:r>
           </a:p>
           <a:p>
@@ -18672,7 +18720,15 @@
           <a:p>
             <a:r>
               <a:rPr lang="en-US" dirty="0"/>
-              <a:t>Considering the upper bound, its effect on the performance of the models seems coherent with what has been observed for CVRP-TW: for smaller/more constrained instances with lower branching factor, the dual bound can actually be useful for search guidance, while it makes the performance worse for greater/less constrained instances.</a:t>
+              <a:t>Considering </a:t>
+            </a:r>
+            <a:r>
+              <a:rPr lang="en-US"/>
+              <a:t>the dual </a:t>
+            </a:r>
+            <a:r>
+              <a:rPr lang="en-US" dirty="0"/>
+              <a:t>bound, its effect on the performance of the models seems coherent with what has been observed for CVRP-TW: for smaller/more constrained instances with lower branching factor, the dual bound can actually be useful for search guidance, while it makes the performance worse for greater/less constrained instances.</a:t>
             </a:r>
           </a:p>
           <a:p>
@@ -21092,19 +21148,19 @@
         </p:spPr>
         <p:txBody>
           <a:bodyPr>
-            <a:normAutofit lnSpcReduction="10000"/>
+            <a:normAutofit fontScale="92500" lnSpcReduction="10000"/>
           </a:bodyPr>
           <a:lstStyle/>
           <a:p>
             <a:r>
               <a:rPr lang="en-US" dirty="0"/>
-              <a:t>For both CP and DIDP, the model formulation building all the paths in parallel lead to better results (even if only slightly) then the alternative formulation.</a:t>
+              <a:t>For both CP and DIDP, the model formulation building all the paths in parallel lead to better results (even if only slightly) then the alternative formulation when applied on the bigger instances.</a:t>
             </a:r>
           </a:p>
           <a:p>
             <a:r>
               <a:rPr lang="en-US" dirty="0"/>
-              <a:t>The only scenario in which the best model was not CP is the Min-Max CVRP on bigger instances, probably because of the type of objective function, which is not just a linear summation, and therefore is more difficult to optimize.</a:t>
+              <a:t>The only case where the CP model was not the best performer occurred in the Min-Max CVRP on the Golden instances. This is likely due to the nature of the objective function, which is not a simple linear summation and is therefore harder to optimize, especially when combined with the increased complexity of larger instances.</a:t>
             </a:r>
           </a:p>
           <a:p>

</xml_diff>